<commit_message>
WGM5 presentation - PoC dates udpated
</commit_message>
<xml_diff>
--- a/08_Project_management/WGM Reports/5th_WGM/AO10649_ePO_WGM5_20180328.pptx
+++ b/08_Project_management/WGM Reports/5th_WGM/AO10649_ePO_WGM5_20180328.pptx
@@ -1605,24 +1605,24 @@
     </dgm:pt>
   </dgm:ptLst>
   <dgm:cxnLst>
+    <dgm:cxn modelId="{820B1B6D-F92B-4413-B1D1-F712BEC91192}" type="presOf" srcId="{C02B7445-14E0-4D06-9B03-984AE41B22C5}" destId="{E3EDB00F-2E2E-46CA-84E9-C74733C999F0}" srcOrd="0" destOrd="0" presId="urn:microsoft.com/office/officeart/2005/8/layout/process4"/>
+    <dgm:cxn modelId="{6FC25745-2D56-4096-B82E-756B139B5B62}" type="presOf" srcId="{82F22BBC-7D35-4ED1-A514-CCD8C62ACB3C}" destId="{45678C51-63E7-4DA2-B61B-1E8B79C90FAB}" srcOrd="0" destOrd="0" presId="urn:microsoft.com/office/officeart/2005/8/layout/process4"/>
+    <dgm:cxn modelId="{88784017-02B6-4A1F-A566-4A28722699CE}" type="presOf" srcId="{4D125206-C77E-4726-A3A2-FF19FE30E3E5}" destId="{B098007B-9F32-4DC4-AB82-9A88F7C53E9E}" srcOrd="1" destOrd="0" presId="urn:microsoft.com/office/officeart/2005/8/layout/process4"/>
+    <dgm:cxn modelId="{4F0ED8E2-310B-4FB6-AE2A-C919BB130A24}" type="presOf" srcId="{F3980690-DFD2-4120-A38B-ADB308455659}" destId="{13CF0A61-9D84-4140-A925-81A1533A98A2}" srcOrd="0" destOrd="0" presId="urn:microsoft.com/office/officeart/2005/8/layout/process4"/>
+    <dgm:cxn modelId="{1B9B07A1-B48F-411A-9B10-A4F1B52BFF9C}" type="presOf" srcId="{4D125206-C77E-4726-A3A2-FF19FE30E3E5}" destId="{2F5238BC-14A6-4A88-B495-2152F3401D95}" srcOrd="0" destOrd="0" presId="urn:microsoft.com/office/officeart/2005/8/layout/process4"/>
+    <dgm:cxn modelId="{739C2A65-CED1-4243-A95D-68BFB547F349}" srcId="{5637624B-CF98-49D9-A112-8B65EED2B6AD}" destId="{4D125206-C77E-4726-A3A2-FF19FE30E3E5}" srcOrd="0" destOrd="0" parTransId="{7C4C87F8-5AD7-48F6-B5E4-51871EE922C3}" sibTransId="{01831A68-C611-447F-9528-51A5F4F0EFE4}"/>
+    <dgm:cxn modelId="{86374187-6ECD-48B9-B8C6-C8ACD2A02BBD}" srcId="{4D125206-C77E-4726-A3A2-FF19FE30E3E5}" destId="{F3980690-DFD2-4120-A38B-ADB308455659}" srcOrd="1" destOrd="0" parTransId="{C2D7AADE-ADCE-4853-8273-27B5835C328C}" sibTransId="{497573C9-2C52-468C-9A2D-3D0B7C391547}"/>
+    <dgm:cxn modelId="{F54D6D3F-42A5-4DA5-BDC0-4BEA3BDDB692}" srcId="{5637624B-CF98-49D9-A112-8B65EED2B6AD}" destId="{C02B7445-14E0-4D06-9B03-984AE41B22C5}" srcOrd="1" destOrd="0" parTransId="{6A1E0D90-6C08-465F-B759-421BEA812F88}" sibTransId="{EF255D7A-7B4B-4A62-A955-A05ECF4DC620}"/>
+    <dgm:cxn modelId="{47619D83-E4F5-4125-B066-320C62D52C62}" type="presOf" srcId="{5637624B-CF98-49D9-A112-8B65EED2B6AD}" destId="{E9564414-79E7-41E6-81FA-F4EB5B151330}" srcOrd="0" destOrd="0" presId="urn:microsoft.com/office/officeart/2005/8/layout/process4"/>
+    <dgm:cxn modelId="{425D8243-9468-4E6D-974F-E9865774A6DC}" type="presOf" srcId="{989F981A-F6DB-4728-9BC0-61CE55C75925}" destId="{5C2633E4-C75F-4966-B19A-8A9A4844E4E1}" srcOrd="0" destOrd="0" presId="urn:microsoft.com/office/officeart/2005/8/layout/process4"/>
+    <dgm:cxn modelId="{48C2513E-78A3-4CF5-8D00-6EFA97762503}" srcId="{C02B7445-14E0-4D06-9B03-984AE41B22C5}" destId="{AC0E2405-852D-4285-B919-DAE43C0395FA}" srcOrd="0" destOrd="0" parTransId="{D4BB168D-F08E-48AE-9494-793185B4F316}" sibTransId="{F8CB7D01-AF78-49FC-ADFE-7B88DDC84643}"/>
+    <dgm:cxn modelId="{07D82D14-4F8F-46EA-9D45-2C3846703311}" type="presOf" srcId="{82F22BBC-7D35-4ED1-A514-CCD8C62ACB3C}" destId="{8CFDA264-56DD-415E-AA2A-365F7226E341}" srcOrd="1" destOrd="0" presId="urn:microsoft.com/office/officeart/2005/8/layout/process4"/>
+    <dgm:cxn modelId="{31CB26FC-69B9-4D83-9AD2-9129FE4107FC}" type="presOf" srcId="{EFC197B4-C02F-48FA-9457-F1B442B3D9C0}" destId="{66BCCCEE-5710-420A-803E-A7FD0FACB297}" srcOrd="0" destOrd="0" presId="urn:microsoft.com/office/officeart/2005/8/layout/process4"/>
+    <dgm:cxn modelId="{46837DB7-0C70-47D1-91CA-AA8373B616DA}" type="presOf" srcId="{AC0E2405-852D-4285-B919-DAE43C0395FA}" destId="{DE35AA42-AF9D-47B0-B79F-6CA61BB0A9DE}" srcOrd="0" destOrd="0" presId="urn:microsoft.com/office/officeart/2005/8/layout/process4"/>
+    <dgm:cxn modelId="{FA19F707-3F52-4EF6-BFBD-E02E62F09C48}" type="presOf" srcId="{C02B7445-14E0-4D06-9B03-984AE41B22C5}" destId="{43E192CE-7D58-4FE4-97FD-AE4862F328DD}" srcOrd="1" destOrd="0" presId="urn:microsoft.com/office/officeart/2005/8/layout/process4"/>
     <dgm:cxn modelId="{E277EE2E-83C9-4C99-90EC-6E0306ACA36A}" srcId="{82F22BBC-7D35-4ED1-A514-CCD8C62ACB3C}" destId="{989F981A-F6DB-4728-9BC0-61CE55C75925}" srcOrd="0" destOrd="0" parTransId="{B285904D-C8F2-4C91-86C7-5C278045F954}" sibTransId="{15BC7C30-FB05-47B8-B7B7-5DE4BF4D1040}"/>
-    <dgm:cxn modelId="{820B1B6D-F92B-4413-B1D1-F712BEC91192}" type="presOf" srcId="{C02B7445-14E0-4D06-9B03-984AE41B22C5}" destId="{E3EDB00F-2E2E-46CA-84E9-C74733C999F0}" srcOrd="0" destOrd="0" presId="urn:microsoft.com/office/officeart/2005/8/layout/process4"/>
-    <dgm:cxn modelId="{07D82D14-4F8F-46EA-9D45-2C3846703311}" type="presOf" srcId="{82F22BBC-7D35-4ED1-A514-CCD8C62ACB3C}" destId="{8CFDA264-56DD-415E-AA2A-365F7226E341}" srcOrd="1" destOrd="0" presId="urn:microsoft.com/office/officeart/2005/8/layout/process4"/>
-    <dgm:cxn modelId="{86374187-6ECD-48B9-B8C6-C8ACD2A02BBD}" srcId="{4D125206-C77E-4726-A3A2-FF19FE30E3E5}" destId="{F3980690-DFD2-4120-A38B-ADB308455659}" srcOrd="1" destOrd="0" parTransId="{C2D7AADE-ADCE-4853-8273-27B5835C328C}" sibTransId="{497573C9-2C52-468C-9A2D-3D0B7C391547}"/>
-    <dgm:cxn modelId="{48C2513E-78A3-4CF5-8D00-6EFA97762503}" srcId="{C02B7445-14E0-4D06-9B03-984AE41B22C5}" destId="{AC0E2405-852D-4285-B919-DAE43C0395FA}" srcOrd="0" destOrd="0" parTransId="{D4BB168D-F08E-48AE-9494-793185B4F316}" sibTransId="{F8CB7D01-AF78-49FC-ADFE-7B88DDC84643}"/>
-    <dgm:cxn modelId="{88784017-02B6-4A1F-A566-4A28722699CE}" type="presOf" srcId="{4D125206-C77E-4726-A3A2-FF19FE30E3E5}" destId="{B098007B-9F32-4DC4-AB82-9A88F7C53E9E}" srcOrd="1" destOrd="0" presId="urn:microsoft.com/office/officeart/2005/8/layout/process4"/>
-    <dgm:cxn modelId="{FA19F707-3F52-4EF6-BFBD-E02E62F09C48}" type="presOf" srcId="{C02B7445-14E0-4D06-9B03-984AE41B22C5}" destId="{43E192CE-7D58-4FE4-97FD-AE4862F328DD}" srcOrd="1" destOrd="0" presId="urn:microsoft.com/office/officeart/2005/8/layout/process4"/>
-    <dgm:cxn modelId="{739C2A65-CED1-4243-A95D-68BFB547F349}" srcId="{5637624B-CF98-49D9-A112-8B65EED2B6AD}" destId="{4D125206-C77E-4726-A3A2-FF19FE30E3E5}" srcOrd="0" destOrd="0" parTransId="{7C4C87F8-5AD7-48F6-B5E4-51871EE922C3}" sibTransId="{01831A68-C611-447F-9528-51A5F4F0EFE4}"/>
-    <dgm:cxn modelId="{47619D83-E4F5-4125-B066-320C62D52C62}" type="presOf" srcId="{5637624B-CF98-49D9-A112-8B65EED2B6AD}" destId="{E9564414-79E7-41E6-81FA-F4EB5B151330}" srcOrd="0" destOrd="0" presId="urn:microsoft.com/office/officeart/2005/8/layout/process4"/>
-    <dgm:cxn modelId="{46837DB7-0C70-47D1-91CA-AA8373B616DA}" type="presOf" srcId="{AC0E2405-852D-4285-B919-DAE43C0395FA}" destId="{DE35AA42-AF9D-47B0-B79F-6CA61BB0A9DE}" srcOrd="0" destOrd="0" presId="urn:microsoft.com/office/officeart/2005/8/layout/process4"/>
+    <dgm:cxn modelId="{22200190-F255-49E0-8094-8C3803EF972C}" srcId="{4D125206-C77E-4726-A3A2-FF19FE30E3E5}" destId="{EFC197B4-C02F-48FA-9457-F1B442B3D9C0}" srcOrd="0" destOrd="0" parTransId="{13DA3FB1-1299-45AB-8AF2-9788BE3BAD2E}" sibTransId="{31583868-D42E-4C7D-9DE0-7B7CFF60F563}"/>
     <dgm:cxn modelId="{51BF28CD-9657-4672-93D6-607C13701383}" srcId="{5637624B-CF98-49D9-A112-8B65EED2B6AD}" destId="{82F22BBC-7D35-4ED1-A514-CCD8C62ACB3C}" srcOrd="2" destOrd="0" parTransId="{97FC9989-CBC4-4F6A-B1A9-67A4DFF8E8A7}" sibTransId="{BB5D41C3-3C5A-4D28-BC9D-ED75DC04673F}"/>
-    <dgm:cxn modelId="{1B9B07A1-B48F-411A-9B10-A4F1B52BFF9C}" type="presOf" srcId="{4D125206-C77E-4726-A3A2-FF19FE30E3E5}" destId="{2F5238BC-14A6-4A88-B495-2152F3401D95}" srcOrd="0" destOrd="0" presId="urn:microsoft.com/office/officeart/2005/8/layout/process4"/>
-    <dgm:cxn modelId="{4F0ED8E2-310B-4FB6-AE2A-C919BB130A24}" type="presOf" srcId="{F3980690-DFD2-4120-A38B-ADB308455659}" destId="{13CF0A61-9D84-4140-A925-81A1533A98A2}" srcOrd="0" destOrd="0" presId="urn:microsoft.com/office/officeart/2005/8/layout/process4"/>
-    <dgm:cxn modelId="{31CB26FC-69B9-4D83-9AD2-9129FE4107FC}" type="presOf" srcId="{EFC197B4-C02F-48FA-9457-F1B442B3D9C0}" destId="{66BCCCEE-5710-420A-803E-A7FD0FACB297}" srcOrd="0" destOrd="0" presId="urn:microsoft.com/office/officeart/2005/8/layout/process4"/>
-    <dgm:cxn modelId="{425D8243-9468-4E6D-974F-E9865774A6DC}" type="presOf" srcId="{989F981A-F6DB-4728-9BC0-61CE55C75925}" destId="{5C2633E4-C75F-4966-B19A-8A9A4844E4E1}" srcOrd="0" destOrd="0" presId="urn:microsoft.com/office/officeart/2005/8/layout/process4"/>
-    <dgm:cxn modelId="{6FC25745-2D56-4096-B82E-756B139B5B62}" type="presOf" srcId="{82F22BBC-7D35-4ED1-A514-CCD8C62ACB3C}" destId="{45678C51-63E7-4DA2-B61B-1E8B79C90FAB}" srcOrd="0" destOrd="0" presId="urn:microsoft.com/office/officeart/2005/8/layout/process4"/>
-    <dgm:cxn modelId="{22200190-F255-49E0-8094-8C3803EF972C}" srcId="{4D125206-C77E-4726-A3A2-FF19FE30E3E5}" destId="{EFC197B4-C02F-48FA-9457-F1B442B3D9C0}" srcOrd="0" destOrd="0" parTransId="{13DA3FB1-1299-45AB-8AF2-9788BE3BAD2E}" sibTransId="{31583868-D42E-4C7D-9DE0-7B7CFF60F563}"/>
-    <dgm:cxn modelId="{F54D6D3F-42A5-4DA5-BDC0-4BEA3BDDB692}" srcId="{5637624B-CF98-49D9-A112-8B65EED2B6AD}" destId="{C02B7445-14E0-4D06-9B03-984AE41B22C5}" srcOrd="1" destOrd="0" parTransId="{6A1E0D90-6C08-465F-B759-421BEA812F88}" sibTransId="{EF255D7A-7B4B-4A62-A955-A05ECF4DC620}"/>
     <dgm:cxn modelId="{78E397ED-4E04-41EC-AFD8-23D6A72CD221}" type="presParOf" srcId="{E9564414-79E7-41E6-81FA-F4EB5B151330}" destId="{EA3C11D4-9832-40CF-9E66-40CC9CEC7A37}" srcOrd="0" destOrd="0" presId="urn:microsoft.com/office/officeart/2005/8/layout/process4"/>
     <dgm:cxn modelId="{719E3BB6-0B49-42E6-97A0-C48E65412C80}" type="presParOf" srcId="{EA3C11D4-9832-40CF-9E66-40CC9CEC7A37}" destId="{45678C51-63E7-4DA2-B61B-1E8B79C90FAB}" srcOrd="0" destOrd="0" presId="urn:microsoft.com/office/officeart/2005/8/layout/process4"/>
     <dgm:cxn modelId="{64D89A0A-7345-45C6-8042-957D448615B4}" type="presParOf" srcId="{EA3C11D4-9832-40CF-9E66-40CC9CEC7A37}" destId="{8CFDA264-56DD-415E-AA2A-365F7226E341}" srcOrd="1" destOrd="0" presId="urn:microsoft.com/office/officeart/2005/8/layout/process4"/>
@@ -3711,7 +3711,7 @@
           <a:p>
             <a:fld id="{84D25693-BD7B-D64E-A502-45C643A30F12}" type="datetimeFigureOut">
               <a:rPr lang="en-US" smtClean="0"/>
-              <a:t>3/27/2018</a:t>
+              <a:t>3/28/2018</a:t>
             </a:fld>
             <a:endParaRPr lang="en-US"/>
           </a:p>
@@ -3777,7 +3777,7 @@
           <a:p>
             <a:fld id="{E10ABBC5-7A13-0C43-B9A0-047FFA3481B1}" type="slidenum">
               <a:rPr lang="en-US" smtClean="0"/>
-              <a:t>‹#›</a:t>
+              <a:t>‹Nº›</a:t>
             </a:fld>
             <a:endParaRPr lang="en-US"/>
           </a:p>
@@ -3876,7 +3876,7 @@
           <a:p>
             <a:fld id="{B80B7B97-A3AD-4716-8E75-2C110C289872}" type="datetimeFigureOut">
               <a:rPr lang="en-US" smtClean="0"/>
-              <a:t>3/27/2018</a:t>
+              <a:t>3/28/2018</a:t>
             </a:fld>
             <a:endParaRPr lang="en-US"/>
           </a:p>
@@ -4034,7 +4034,7 @@
           <a:p>
             <a:fld id="{1CB81651-EBBD-46D2-9860-19D52AC33014}" type="slidenum">
               <a:rPr lang="en-US" smtClean="0"/>
-              <a:t>‹#›</a:t>
+              <a:t>‹Nº›</a:t>
             </a:fld>
             <a:endParaRPr lang="en-US"/>
           </a:p>
@@ -4925,7 +4925,7 @@
           <a:p>
             <a:fld id="{391B6FEC-58CB-4640-8F27-5DA0DEFEFAB6}" type="slidenum">
               <a:rPr lang="en-US" smtClean="0"/>
-              <a:t>‹#›</a:t>
+              <a:t>‹Nº›</a:t>
             </a:fld>
             <a:endParaRPr lang="en-US"/>
           </a:p>
@@ -5179,7 +5179,7 @@
           <a:p>
             <a:fld id="{391B6FEC-58CB-4640-8F27-5DA0DEFEFAB6}" type="slidenum">
               <a:rPr lang="en-US" smtClean="0"/>
-              <a:t>‹#›</a:t>
+              <a:t>‹Nº›</a:t>
             </a:fld>
             <a:endParaRPr lang="en-US"/>
           </a:p>
@@ -5351,7 +5351,7 @@
           <a:p>
             <a:fld id="{391B6FEC-58CB-4640-8F27-5DA0DEFEFAB6}" type="slidenum">
               <a:rPr lang="en-US" smtClean="0"/>
-              <a:t>‹#›</a:t>
+              <a:t>‹Nº›</a:t>
             </a:fld>
             <a:endParaRPr lang="en-US"/>
           </a:p>
@@ -5528,7 +5528,7 @@
           <a:p>
             <a:fld id="{391B6FEC-58CB-4640-8F27-5DA0DEFEFAB6}" type="slidenum">
               <a:rPr lang="en-US" smtClean="0"/>
-              <a:t>‹#›</a:t>
+              <a:t>‹Nº›</a:t>
             </a:fld>
             <a:endParaRPr lang="en-US"/>
           </a:p>
@@ -5652,7 +5652,7 @@
                 </a:solidFill>
               </a:rPr>
               <a:pPr/>
-              <a:t>‹#›</a:t>
+              <a:t>‹Nº›</a:t>
             </a:fld>
             <a:endParaRPr lang="es-ES">
               <a:solidFill>
@@ -5855,7 +5855,7 @@
           <a:p>
             <a:fld id="{391B6FEC-58CB-4640-8F27-5DA0DEFEFAB6}" type="slidenum">
               <a:rPr lang="en-US" smtClean="0"/>
-              <a:t>‹#›</a:t>
+              <a:t>‹Nº›</a:t>
             </a:fld>
             <a:endParaRPr lang="en-US"/>
           </a:p>
@@ -6056,7 +6056,7 @@
           <a:p>
             <a:fld id="{391B6FEC-58CB-4640-8F27-5DA0DEFEFAB6}" type="slidenum">
               <a:rPr lang="en-US" smtClean="0"/>
-              <a:t>‹#›</a:t>
+              <a:t>‹Nº›</a:t>
             </a:fld>
             <a:endParaRPr lang="en-US"/>
           </a:p>
@@ -6311,7 +6311,7 @@
           <a:p>
             <a:fld id="{391B6FEC-58CB-4640-8F27-5DA0DEFEFAB6}" type="slidenum">
               <a:rPr lang="en-US" smtClean="0"/>
-              <a:t>‹#›</a:t>
+              <a:t>‹Nº›</a:t>
             </a:fld>
             <a:endParaRPr lang="en-US"/>
           </a:p>
@@ -6715,7 +6715,7 @@
           <a:p>
             <a:fld id="{391B6FEC-58CB-4640-8F27-5DA0DEFEFAB6}" type="slidenum">
               <a:rPr lang="en-US" smtClean="0"/>
-              <a:t>‹#›</a:t>
+              <a:t>‹Nº›</a:t>
             </a:fld>
             <a:endParaRPr lang="en-US"/>
           </a:p>
@@ -6948,7 +6948,7 @@
           <a:p>
             <a:fld id="{391B6FEC-58CB-4640-8F27-5DA0DEFEFAB6}" type="slidenum">
               <a:rPr lang="en-US" smtClean="0"/>
-              <a:t>‹#›</a:t>
+              <a:t>‹Nº›</a:t>
             </a:fld>
             <a:endParaRPr lang="en-US"/>
           </a:p>
@@ -7311,7 +7311,7 @@
           <a:p>
             <a:fld id="{391B6FEC-58CB-4640-8F27-5DA0DEFEFAB6}" type="slidenum">
               <a:rPr lang="en-US" smtClean="0"/>
-              <a:t>‹#›</a:t>
+              <a:t>‹Nº›</a:t>
             </a:fld>
             <a:endParaRPr lang="en-US"/>
           </a:p>
@@ -7432,7 +7432,7 @@
           <a:p>
             <a:fld id="{391B6FEC-58CB-4640-8F27-5DA0DEFEFAB6}" type="slidenum">
               <a:rPr lang="en-US" smtClean="0"/>
-              <a:t>‹#›</a:t>
+              <a:t>‹Nº›</a:t>
             </a:fld>
             <a:endParaRPr lang="en-US"/>
           </a:p>
@@ -7523,7 +7523,7 @@
           <a:p>
             <a:fld id="{391B6FEC-58CB-4640-8F27-5DA0DEFEFAB6}" type="slidenum">
               <a:rPr lang="en-US" smtClean="0"/>
-              <a:t>‹#›</a:t>
+              <a:t>‹Nº›</a:t>
             </a:fld>
             <a:endParaRPr lang="en-US"/>
           </a:p>
@@ -7734,7 +7734,7 @@
           <a:p>
             <a:fld id="{391B6FEC-58CB-4640-8F27-5DA0DEFEFAB6}" type="slidenum">
               <a:rPr lang="en-US" smtClean="0"/>
-              <a:t>‹#›</a:t>
+              <a:t>‹Nº›</a:t>
             </a:fld>
             <a:endParaRPr lang="en-US"/>
           </a:p>
@@ -9409,19 +9409,19 @@
               <a:defRPr/>
             </a:pPr>
             <a:r>
-              <a:rPr lang="en-US">
+              <a:rPr lang="en-US" dirty="0">
                 <a:sym typeface="Wingdings" panose="05000000000000000000" pitchFamily="2" charset="2"/>
               </a:rPr>
               <a:t>19</a:t>
             </a:r>
             <a:r>
-              <a:rPr lang="en-US" baseline="30000">
+              <a:rPr lang="en-US" baseline="30000" dirty="0">
                 <a:sym typeface="Wingdings" panose="05000000000000000000" pitchFamily="2" charset="2"/>
               </a:rPr>
               <a:t>th</a:t>
             </a:r>
             <a:r>
-              <a:rPr lang="en-US">
+              <a:rPr lang="en-US" dirty="0">
                 <a:sym typeface="Wingdings" panose="05000000000000000000" pitchFamily="2" charset="2"/>
               </a:rPr>
               <a:t> April</a:t>
@@ -9434,19 +9434,19 @@
               <a:defRPr/>
             </a:pPr>
             <a:r>
-              <a:rPr lang="en-US" b="0">
+              <a:rPr lang="en-US" b="0" dirty="0">
                 <a:sym typeface="Wingdings" panose="05000000000000000000" pitchFamily="2" charset="2"/>
               </a:rPr>
               <a:t>First version of </a:t>
             </a:r>
             <a:r>
-              <a:rPr lang="en-US" b="0" err="1">
+              <a:rPr lang="en-US" b="0" dirty="0" err="1">
                 <a:sym typeface="Wingdings" panose="05000000000000000000" pitchFamily="2" charset="2"/>
               </a:rPr>
               <a:t>PoC</a:t>
             </a:r>
             <a:r>
-              <a:rPr lang="en-US" b="0">
+              <a:rPr lang="en-US" b="0" dirty="0">
                 <a:sym typeface="Wingdings" panose="05000000000000000000" pitchFamily="2" charset="2"/>
               </a:rPr>
               <a:t> available for revision by WG.</a:t>
@@ -9458,7 +9458,7 @@
               <a:buChar char="•"/>
               <a:defRPr/>
             </a:pPr>
-            <a:endParaRPr lang="en-US">
+            <a:endParaRPr lang="en-US" dirty="0">
               <a:sym typeface="Wingdings" panose="05000000000000000000" pitchFamily="2" charset="2"/>
             </a:endParaRPr>
           </a:p>
@@ -9469,23 +9469,32 @@
               <a:defRPr/>
             </a:pPr>
             <a:r>
-              <a:rPr lang="en-US">
+              <a:rPr lang="en-US" dirty="0">
                 <a:sym typeface="Wingdings" panose="05000000000000000000" pitchFamily="2" charset="2"/>
               </a:rPr>
               <a:t>26</a:t>
             </a:r>
             <a:r>
-              <a:rPr lang="en-US" baseline="30000">
+              <a:rPr lang="en-US" baseline="30000" dirty="0">
                 <a:sym typeface="Wingdings" panose="05000000000000000000" pitchFamily="2" charset="2"/>
               </a:rPr>
               <a:t>th</a:t>
             </a:r>
             <a:r>
-              <a:rPr lang="en-US">
+              <a:rPr lang="en-US" dirty="0">
                 <a:sym typeface="Wingdings" panose="05000000000000000000" pitchFamily="2" charset="2"/>
               </a:rPr>
-              <a:t> April</a:t>
-            </a:r>
+              <a:t> </a:t>
+            </a:r>
+            <a:r>
+              <a:rPr lang="en-US" dirty="0" smtClean="0">
+                <a:sym typeface="Wingdings" panose="05000000000000000000" pitchFamily="2" charset="2"/>
+              </a:rPr>
+              <a:t>May</a:t>
+            </a:r>
+            <a:endParaRPr lang="en-US" dirty="0">
+              <a:sym typeface="Wingdings" panose="05000000000000000000" pitchFamily="2" charset="2"/>
+            </a:endParaRPr>
           </a:p>
           <a:p>
             <a:pPr marL="800100" lvl="1" indent="-285750">
@@ -9494,13 +9503,13 @@
               <a:defRPr/>
             </a:pPr>
             <a:r>
-              <a:rPr lang="en-US" err="1">
+              <a:rPr lang="en-US" dirty="0" err="1">
                 <a:sym typeface="Wingdings" panose="05000000000000000000" pitchFamily="2" charset="2"/>
               </a:rPr>
               <a:t>PoC</a:t>
             </a:r>
             <a:r>
-              <a:rPr lang="en-US">
+              <a:rPr lang="en-US" dirty="0">
                 <a:sym typeface="Wingdings" panose="05000000000000000000" pitchFamily="2" charset="2"/>
               </a:rPr>
               <a:t> final report available for comments by WG.</a:t>
@@ -9512,7 +9521,7 @@
               <a:buChar char="•"/>
               <a:defRPr/>
             </a:pPr>
-            <a:endParaRPr lang="en-US" b="0">
+            <a:endParaRPr lang="en-US" b="0" dirty="0">
               <a:sym typeface="Wingdings" panose="05000000000000000000" pitchFamily="2" charset="2"/>
             </a:endParaRPr>
           </a:p>
@@ -9753,7 +9762,7 @@
               <a:buAutoNum type="arabicPeriod"/>
             </a:pPr>
             <a:r>
-              <a:rPr lang="en-US" sz="1800">
+              <a:rPr lang="en-US" sz="1800" dirty="0">
                 <a:solidFill>
                   <a:srgbClr val="505050"/>
                 </a:solidFill>
@@ -9772,7 +9781,7 @@
               <a:buAutoNum type="arabicPeriod"/>
             </a:pPr>
             <a:r>
-              <a:rPr lang="en-US" sz="1800">
+              <a:rPr lang="en-US" sz="1800" dirty="0">
                 <a:solidFill>
                   <a:srgbClr val="505050"/>
                 </a:solidFill>
@@ -9782,7 +9791,7 @@
               <a:t>Glossary feedback (</a:t>
             </a:r>
             <a:r>
-              <a:rPr lang="en-US" sz="1800" i="1">
+              <a:rPr lang="en-US" sz="1800" i="1" dirty="0">
                 <a:solidFill>
                   <a:srgbClr val="505050"/>
                 </a:solidFill>
@@ -9792,7 +9801,7 @@
               <a:t>Natalie </a:t>
             </a:r>
             <a:r>
-              <a:rPr lang="en-US" sz="1800" i="1" err="1">
+              <a:rPr lang="en-US" sz="1800" i="1" dirty="0" err="1">
                 <a:solidFill>
                   <a:srgbClr val="505050"/>
                 </a:solidFill>
@@ -9802,7 +9811,7 @@
               <a:t>Muric</a:t>
             </a:r>
             <a:r>
-              <a:rPr lang="en-US" sz="1800">
+              <a:rPr lang="en-US" sz="1800" dirty="0">
                 <a:solidFill>
                   <a:srgbClr val="505050"/>
                 </a:solidFill>
@@ -9821,7 +9830,7 @@
               <a:buAutoNum type="arabicPeriod"/>
             </a:pPr>
             <a:r>
-              <a:rPr lang="es-ES" sz="1800" err="1">
+              <a:rPr lang="es-ES" sz="1800" dirty="0" err="1">
                 <a:solidFill>
                   <a:srgbClr val="505050"/>
                 </a:solidFill>
@@ -9831,7 +9840,7 @@
               <a:t>Expectations</a:t>
             </a:r>
             <a:r>
-              <a:rPr lang="es-ES" sz="1800">
+              <a:rPr lang="es-ES" sz="1800" dirty="0">
                 <a:solidFill>
                   <a:srgbClr val="505050"/>
                 </a:solidFill>
@@ -9841,7 +9850,7 @@
               <a:t> </a:t>
             </a:r>
             <a:r>
-              <a:rPr lang="es-ES" sz="1800" err="1">
+              <a:rPr lang="es-ES" sz="1800" dirty="0" err="1">
                 <a:solidFill>
                   <a:srgbClr val="505050"/>
                 </a:solidFill>
@@ -9851,7 +9860,7 @@
               <a:t>from</a:t>
             </a:r>
             <a:r>
-              <a:rPr lang="es-ES" sz="1800">
+              <a:rPr lang="es-ES" sz="1800" dirty="0">
                 <a:solidFill>
                   <a:srgbClr val="505050"/>
                 </a:solidFill>
@@ -9861,7 +9870,7 @@
               <a:t> WG (</a:t>
             </a:r>
             <a:r>
-              <a:rPr lang="es-ES" sz="1800" i="1">
+              <a:rPr lang="es-ES" sz="1800" i="1" dirty="0">
                 <a:solidFill>
                   <a:srgbClr val="505050"/>
                 </a:solidFill>
@@ -9871,7 +9880,7 @@
               <a:t>Virginia Gomariz</a:t>
             </a:r>
             <a:r>
-              <a:rPr lang="es-ES" sz="1800">
+              <a:rPr lang="es-ES" sz="1800" dirty="0">
                 <a:solidFill>
                   <a:srgbClr val="505050"/>
                 </a:solidFill>
@@ -9880,7 +9889,7 @@
               </a:rPr>
               <a:t>)</a:t>
             </a:r>
-            <a:endParaRPr lang="en-US" sz="1800">
+            <a:endParaRPr lang="en-US" sz="1800" dirty="0">
               <a:solidFill>
                 <a:srgbClr val="505050"/>
               </a:solidFill>
@@ -9897,35 +9906,52 @@
               <a:buAutoNum type="arabicPeriod"/>
             </a:pPr>
             <a:r>
-              <a:rPr lang="en-US" sz="1800">
+              <a:rPr lang="en-US" sz="1800" dirty="0">
                 <a:solidFill>
                   <a:srgbClr val="505050"/>
                 </a:solidFill>
                 <a:latin typeface="Arial" panose="020B0604020202020204" pitchFamily="34" charset="0"/>
                 <a:cs typeface="Arial" panose="020B0604020202020204" pitchFamily="34" charset="0"/>
               </a:rPr>
-              <a:t>Conceptual Data Model (</a:t>
-            </a:r>
-            <a:r>
-              <a:rPr lang="en-US" sz="1800" i="1">
+              <a:t>Conceptual Data Model </a:t>
+            </a:r>
+            <a:r>
+              <a:rPr lang="en-US" sz="1800" dirty="0" smtClean="0">
                 <a:solidFill>
                   <a:srgbClr val="505050"/>
                 </a:solidFill>
                 <a:latin typeface="Arial" panose="020B0604020202020204" pitchFamily="34" charset="0"/>
                 <a:cs typeface="Arial" panose="020B0604020202020204" pitchFamily="34" charset="0"/>
               </a:rPr>
-              <a:t>Maria Font</a:t>
-            </a:r>
-            <a:r>
-              <a:rPr lang="en-US" sz="1800">
+              <a:t>(</a:t>
+            </a:r>
+            <a:r>
+              <a:rPr lang="en-US" sz="1800" i="1" dirty="0">
                 <a:solidFill>
                   <a:srgbClr val="505050"/>
                 </a:solidFill>
                 <a:latin typeface="Arial" panose="020B0604020202020204" pitchFamily="34" charset="0"/>
                 <a:cs typeface="Arial" panose="020B0604020202020204" pitchFamily="34" charset="0"/>
               </a:rPr>
+              <a:t>Enric Staromiejski</a:t>
+            </a:r>
+            <a:r>
+              <a:rPr lang="en-US" sz="1800" dirty="0" smtClean="0">
+                <a:solidFill>
+                  <a:srgbClr val="505050"/>
+                </a:solidFill>
+                <a:latin typeface="Arial" panose="020B0604020202020204" pitchFamily="34" charset="0"/>
+                <a:cs typeface="Arial" panose="020B0604020202020204" pitchFamily="34" charset="0"/>
+              </a:rPr>
               <a:t>)</a:t>
             </a:r>
+            <a:endParaRPr lang="en-US" sz="1800" dirty="0">
+              <a:solidFill>
+                <a:srgbClr val="505050"/>
+              </a:solidFill>
+              <a:latin typeface="Arial" panose="020B0604020202020204" pitchFamily="34" charset="0"/>
+              <a:cs typeface="Arial" panose="020B0604020202020204" pitchFamily="34" charset="0"/>
+            </a:endParaRPr>
           </a:p>
           <a:p>
             <a:pPr>
@@ -9936,7 +9962,7 @@
               <a:buAutoNum type="arabicPeriod"/>
             </a:pPr>
             <a:r>
-              <a:rPr lang="en-US" sz="1800">
+              <a:rPr lang="en-US" sz="1800" dirty="0">
                 <a:solidFill>
                   <a:srgbClr val="505050"/>
                 </a:solidFill>
@@ -9946,7 +9972,7 @@
               <a:t>Preparation of the </a:t>
             </a:r>
             <a:r>
-              <a:rPr lang="en-US" sz="1800" err="1">
+              <a:rPr lang="en-US" sz="1800" dirty="0" err="1">
                 <a:solidFill>
                   <a:srgbClr val="505050"/>
                 </a:solidFill>
@@ -9956,7 +9982,7 @@
               <a:t>PoC</a:t>
             </a:r>
             <a:r>
-              <a:rPr lang="en-US" sz="1800">
+              <a:rPr lang="en-US" sz="1800" dirty="0">
                 <a:solidFill>
                   <a:srgbClr val="505050"/>
                 </a:solidFill>
@@ -9966,7 +9992,7 @@
               <a:t> (</a:t>
             </a:r>
             <a:r>
-              <a:rPr lang="en-US" sz="1800" i="1">
+              <a:rPr lang="en-US" sz="1800" i="1" dirty="0">
                 <a:solidFill>
                   <a:srgbClr val="505050"/>
                 </a:solidFill>
@@ -9976,7 +10002,7 @@
               <a:t>Enric Staromiejski</a:t>
             </a:r>
             <a:r>
-              <a:rPr lang="en-US" sz="1800">
+              <a:rPr lang="en-US" sz="1800" dirty="0">
                 <a:solidFill>
                   <a:srgbClr val="505050"/>
                 </a:solidFill>
@@ -9995,7 +10021,7 @@
               <a:buAutoNum type="arabicPeriod"/>
             </a:pPr>
             <a:r>
-              <a:rPr lang="en-US" sz="2800" b="1">
+              <a:rPr lang="en-US" sz="2800" b="1" dirty="0">
                 <a:solidFill>
                   <a:srgbClr val="9AAE04"/>
                 </a:solidFill>
@@ -13650,7 +13676,7 @@
               <a:buAutoNum type="arabicPeriod"/>
             </a:pPr>
             <a:r>
-              <a:rPr lang="en-US" sz="1800">
+              <a:rPr lang="en-US" sz="1800" dirty="0">
                 <a:solidFill>
                   <a:srgbClr val="505050"/>
                 </a:solidFill>
@@ -13669,7 +13695,7 @@
               <a:buAutoNum type="arabicPeriod"/>
             </a:pPr>
             <a:r>
-              <a:rPr lang="en-US" sz="1800">
+              <a:rPr lang="en-US" sz="1800" dirty="0">
                 <a:solidFill>
                   <a:srgbClr val="505050"/>
                 </a:solidFill>
@@ -13679,7 +13705,7 @@
               <a:t>Glossary feedback (</a:t>
             </a:r>
             <a:r>
-              <a:rPr lang="en-US" sz="1800" i="1">
+              <a:rPr lang="en-US" sz="1800" i="1" dirty="0">
                 <a:solidFill>
                   <a:srgbClr val="505050"/>
                 </a:solidFill>
@@ -13689,7 +13715,7 @@
               <a:t>Natalie </a:t>
             </a:r>
             <a:r>
-              <a:rPr lang="en-US" sz="1800" i="1" err="1">
+              <a:rPr lang="en-US" sz="1800" i="1" dirty="0" err="1">
                 <a:solidFill>
                   <a:srgbClr val="505050"/>
                 </a:solidFill>
@@ -13699,7 +13725,7 @@
               <a:t>Muric</a:t>
             </a:r>
             <a:r>
-              <a:rPr lang="en-US" sz="1800">
+              <a:rPr lang="en-US" sz="1800" dirty="0">
                 <a:solidFill>
                   <a:srgbClr val="505050"/>
                 </a:solidFill>
@@ -13709,7 +13735,7 @@
               <a:t>)</a:t>
             </a:r>
             <a:r>
-              <a:rPr lang="es-ES" sz="1800">
+              <a:rPr lang="es-ES" sz="1800" dirty="0">
                 <a:solidFill>
                   <a:srgbClr val="505050"/>
                 </a:solidFill>
@@ -13728,7 +13754,7 @@
               <a:buAutoNum type="arabicPeriod"/>
             </a:pPr>
             <a:r>
-              <a:rPr lang="es-ES" sz="1800" err="1">
+              <a:rPr lang="es-ES" sz="1800" dirty="0" err="1">
                 <a:solidFill>
                   <a:srgbClr val="505050"/>
                 </a:solidFill>
@@ -13738,7 +13764,7 @@
               <a:t>Expectations</a:t>
             </a:r>
             <a:r>
-              <a:rPr lang="es-ES" sz="1800">
+              <a:rPr lang="es-ES" sz="1800" dirty="0">
                 <a:solidFill>
                   <a:srgbClr val="505050"/>
                 </a:solidFill>
@@ -13748,7 +13774,7 @@
               <a:t> </a:t>
             </a:r>
             <a:r>
-              <a:rPr lang="es-ES" sz="1800" err="1">
+              <a:rPr lang="es-ES" sz="1800" dirty="0" err="1">
                 <a:solidFill>
                   <a:srgbClr val="505050"/>
                 </a:solidFill>
@@ -13758,7 +13784,7 @@
               <a:t>from</a:t>
             </a:r>
             <a:r>
-              <a:rPr lang="es-ES" sz="1800">
+              <a:rPr lang="es-ES" sz="1800" dirty="0">
                 <a:solidFill>
                   <a:srgbClr val="505050"/>
                 </a:solidFill>
@@ -13768,7 +13794,7 @@
               <a:t> WG (</a:t>
             </a:r>
             <a:r>
-              <a:rPr lang="es-ES" sz="1800" i="1">
+              <a:rPr lang="es-ES" sz="1800" i="1" dirty="0">
                 <a:solidFill>
                   <a:srgbClr val="505050"/>
                 </a:solidFill>
@@ -13778,7 +13804,7 @@
               <a:t>Virginia Gomariz</a:t>
             </a:r>
             <a:r>
-              <a:rPr lang="es-ES" sz="1800">
+              <a:rPr lang="es-ES" sz="1800" dirty="0">
                 <a:solidFill>
                   <a:srgbClr val="505050"/>
                 </a:solidFill>
@@ -13787,7 +13813,7 @@
               </a:rPr>
               <a:t>)</a:t>
             </a:r>
-            <a:endParaRPr lang="en-US" sz="1800">
+            <a:endParaRPr lang="en-US" sz="1800" dirty="0">
               <a:solidFill>
                 <a:srgbClr val="505050"/>
               </a:solidFill>
@@ -13804,7 +13830,7 @@
               <a:buAutoNum type="arabicPeriod"/>
             </a:pPr>
             <a:r>
-              <a:rPr lang="en-US" sz="1800">
+              <a:rPr lang="en-US" sz="1800" dirty="0">
                 <a:solidFill>
                   <a:srgbClr val="505050"/>
                 </a:solidFill>
@@ -13814,7 +13840,7 @@
               <a:t>Conceptual Data Model (</a:t>
             </a:r>
             <a:r>
-              <a:rPr lang="en-US" sz="1800" i="1">
+              <a:rPr lang="en-US" sz="1800" i="1" dirty="0">
                 <a:solidFill>
                   <a:srgbClr val="505050"/>
                 </a:solidFill>
@@ -13824,7 +13850,7 @@
               <a:t>Enric Staromiejski</a:t>
             </a:r>
             <a:r>
-              <a:rPr lang="en-US" sz="1800">
+              <a:rPr lang="en-US" sz="1800" dirty="0">
                 <a:solidFill>
                   <a:srgbClr val="505050"/>
                 </a:solidFill>
@@ -13843,7 +13869,7 @@
               <a:buAutoNum type="arabicPeriod"/>
             </a:pPr>
             <a:r>
-              <a:rPr lang="en-US" sz="2800" b="1">
+              <a:rPr lang="en-US" sz="2800" b="1" dirty="0">
                 <a:solidFill>
                   <a:srgbClr val="9AAE04"/>
                 </a:solidFill>
@@ -13853,7 +13879,7 @@
               <a:t>Preparation of the </a:t>
             </a:r>
             <a:r>
-              <a:rPr lang="en-US" sz="2800" b="1" err="1">
+              <a:rPr lang="en-US" sz="2800" b="1" dirty="0" err="1">
                 <a:solidFill>
                   <a:srgbClr val="9AAE04"/>
                 </a:solidFill>
@@ -13863,7 +13889,7 @@
               <a:t>PoC</a:t>
             </a:r>
             <a:r>
-              <a:rPr lang="en-US" sz="2800" b="1">
+              <a:rPr lang="en-US" sz="2800" b="1" dirty="0">
                 <a:solidFill>
                   <a:srgbClr val="9AAE04"/>
                 </a:solidFill>
@@ -13873,7 +13899,7 @@
               <a:t> </a:t>
             </a:r>
             <a:r>
-              <a:rPr lang="en-US" sz="1800">
+              <a:rPr lang="en-US" sz="1800" dirty="0">
                 <a:solidFill>
                   <a:srgbClr val="505050"/>
                 </a:solidFill>
@@ -13883,7 +13909,7 @@
               <a:t>(</a:t>
             </a:r>
             <a:r>
-              <a:rPr lang="en-US" sz="1800" i="1">
+              <a:rPr lang="en-US" sz="1800" i="1" dirty="0">
                 <a:solidFill>
                   <a:srgbClr val="505050"/>
                 </a:solidFill>
@@ -13893,7 +13919,7 @@
               <a:t>Enric Staromiejski</a:t>
             </a:r>
             <a:r>
-              <a:rPr lang="en-US" sz="1800">
+              <a:rPr lang="en-US" sz="1800" dirty="0">
                 <a:solidFill>
                   <a:srgbClr val="505050"/>
                 </a:solidFill>
@@ -13902,7 +13928,7 @@
               </a:rPr>
               <a:t>) </a:t>
             </a:r>
-            <a:endParaRPr lang="en-US" sz="1400">
+            <a:endParaRPr lang="en-US" sz="1400" dirty="0">
               <a:solidFill>
                 <a:srgbClr val="505050"/>
               </a:solidFill>
@@ -13919,7 +13945,7 @@
               <a:buAutoNum type="arabicPeriod"/>
             </a:pPr>
             <a:r>
-              <a:rPr lang="en-US" sz="1800">
+              <a:rPr lang="en-US" sz="1800" dirty="0">
                 <a:solidFill>
                   <a:srgbClr val="505050"/>
                 </a:solidFill>
@@ -14735,12 +14761,9 @@
 </file>
 
 <file path=customXml/item1.xml><?xml version="1.0" encoding="utf-8"?>
-<?mso-contentType ?>
-<FormTemplates xmlns="http://schemas.microsoft.com/sharepoint/v3/contenttype/forms">
-  <Display>DocumentLibraryForm</Display>
-  <Edit>DocumentLibraryForm</Edit>
-  <New>DocumentLibraryForm</New>
-</FormTemplates>
+<p:properties xmlns:p="http://schemas.microsoft.com/office/2006/metadata/properties" xmlns:xsi="http://www.w3.org/2001/XMLSchema-instance" xmlns:pc="http://schemas.microsoft.com/office/infopath/2007/PartnerControls">
+  <documentManagement/>
+</p:properties>
 </file>
 
 <file path=customXml/item2.xml><?xml version="1.0" encoding="utf-8"?>
@@ -14882,15 +14905,26 @@
 </file>
 
 <file path=customXml/item3.xml><?xml version="1.0" encoding="utf-8"?>
-<p:properties xmlns:p="http://schemas.microsoft.com/office/2006/metadata/properties" xmlns:xsi="http://www.w3.org/2001/XMLSchema-instance" xmlns:pc="http://schemas.microsoft.com/office/infopath/2007/PartnerControls">
-  <documentManagement/>
-</p:properties>
+<?mso-contentType ?>
+<FormTemplates xmlns="http://schemas.microsoft.com/sharepoint/v3/contenttype/forms">
+  <Display>DocumentLibraryForm</Display>
+  <Edit>DocumentLibraryForm</Edit>
+  <New>DocumentLibraryForm</New>
+</FormTemplates>
 </file>
 
 <file path=customXml/itemProps1.xml><?xml version="1.0" encoding="utf-8"?>
-<ds:datastoreItem xmlns:ds="http://schemas.openxmlformats.org/officeDocument/2006/customXml" ds:itemID="{01DCCD54-CEB7-4D93-B603-FE1660D0B3C2}">
+<ds:datastoreItem xmlns:ds="http://schemas.openxmlformats.org/officeDocument/2006/customXml" ds:itemID="{2FF93185-A91A-4472-A3F4-1E1B892525F0}">
   <ds:schemaRefs>
-    <ds:schemaRef ds:uri="http://schemas.microsoft.com/sharepoint/v3/contenttype/forms"/>
+    <ds:schemaRef ds:uri="http://schemas.openxmlformats.org/package/2006/metadata/core-properties"/>
+    <ds:schemaRef ds:uri="http://schemas.microsoft.com/office/2006/documentManagement/types"/>
+    <ds:schemaRef ds:uri="http://schemas.microsoft.com/office/infopath/2007/PartnerControls"/>
+    <ds:schemaRef ds:uri="http://purl.org/dc/elements/1.1/"/>
+    <ds:schemaRef ds:uri="http://schemas.microsoft.com/office/2006/metadata/properties"/>
+    <ds:schemaRef ds:uri="http://purl.org/dc/terms/"/>
+    <ds:schemaRef ds:uri="8a9dc265-2a70-4a01-bf40-b0bb55b38d64"/>
+    <ds:schemaRef ds:uri="http://www.w3.org/XML/1998/namespace"/>
+    <ds:schemaRef ds:uri="http://purl.org/dc/dcmitype/"/>
   </ds:schemaRefs>
 </ds:datastoreItem>
 </file>
@@ -14914,17 +14948,9 @@
 </file>
 
 <file path=customXml/itemProps3.xml><?xml version="1.0" encoding="utf-8"?>
-<ds:datastoreItem xmlns:ds="http://schemas.openxmlformats.org/officeDocument/2006/customXml" ds:itemID="{2FF93185-A91A-4472-A3F4-1E1B892525F0}">
+<ds:datastoreItem xmlns:ds="http://schemas.openxmlformats.org/officeDocument/2006/customXml" ds:itemID="{01DCCD54-CEB7-4D93-B603-FE1660D0B3C2}">
   <ds:schemaRefs>
-    <ds:schemaRef ds:uri="8a9dc265-2a70-4a01-bf40-b0bb55b38d64"/>
-    <ds:schemaRef ds:uri="http://purl.org/dc/dcmitype/"/>
-    <ds:schemaRef ds:uri="http://purl.org/dc/elements/1.1/"/>
-    <ds:schemaRef ds:uri="http://purl.org/dc/terms/"/>
-    <ds:schemaRef ds:uri="http://schemas.microsoft.com/office/2006/documentManagement/types"/>
-    <ds:schemaRef ds:uri="http://schemas.microsoft.com/office/2006/metadata/properties"/>
-    <ds:schemaRef ds:uri="http://schemas.microsoft.com/office/infopath/2007/PartnerControls"/>
-    <ds:schemaRef ds:uri="http://schemas.openxmlformats.org/package/2006/metadata/core-properties"/>
-    <ds:schemaRef ds:uri="http://www.w3.org/XML/1998/namespace"/>
+    <ds:schemaRef ds:uri="http://schemas.microsoft.com/sharepoint/v3/contenttype/forms"/>
   </ds:schemaRefs>
 </ds:datastoreItem>
 </file>
</xml_diff>